<commit_message>
README and gitignore updates
</commit_message>
<xml_diff>
--- a/Work/DB_Work/PowerPoint/Data & Models.pptx
+++ b/Work/DB_Work/PowerPoint/Data & Models.pptx
@@ -11,13 +11,12 @@
     <p:sldId id="259" r:id="rId5"/>
     <p:sldId id="260" r:id="rId6"/>
     <p:sldId id="269" r:id="rId7"/>
-    <p:sldId id="273" r:id="rId8"/>
-    <p:sldId id="272" r:id="rId9"/>
-    <p:sldId id="270" r:id="rId10"/>
-    <p:sldId id="264" r:id="rId11"/>
-    <p:sldId id="267" r:id="rId12"/>
-    <p:sldId id="262" r:id="rId13"/>
-    <p:sldId id="268" r:id="rId14"/>
+    <p:sldId id="272" r:id="rId8"/>
+    <p:sldId id="270" r:id="rId9"/>
+    <p:sldId id="264" r:id="rId10"/>
+    <p:sldId id="267" r:id="rId11"/>
+    <p:sldId id="262" r:id="rId12"/>
+    <p:sldId id="268" r:id="rId13"/>
   </p:sldIdLst>
   <p:sldSz cx="9144000" cy="6858000" type="screen4x3"/>
   <p:notesSz cx="6858000" cy="9144000"/>
@@ -3258,143 +3257,6 @@
               <a:rPr lang="en-US" cap="small" dirty="0" smtClean="0">
                 <a:latin typeface="Impact" panose="020B0806030902050204" pitchFamily="34" charset="0"/>
               </a:rPr>
-              <a:t>Support Vector Classification</a:t>
-            </a:r>
-            <a:endParaRPr lang="en-US" cap="small" dirty="0">
-              <a:latin typeface="Impact" panose="020B0806030902050204" pitchFamily="34" charset="0"/>
-            </a:endParaRPr>
-          </a:p>
-        </p:txBody>
-      </p:sp>
-      <p:sp>
-        <p:nvSpPr>
-          <p:cNvPr id="3" name="Content Placeholder 2"/>
-          <p:cNvSpPr>
-            <a:spLocks noGrp="1"/>
-          </p:cNvSpPr>
-          <p:nvPr>
-            <p:ph idx="1"/>
-          </p:nvPr>
-        </p:nvSpPr>
-        <p:spPr/>
-        <p:txBody>
-          <a:bodyPr>
-            <a:normAutofit/>
-          </a:bodyPr>
-          <a:lstStyle/>
-          <a:p>
-            <a:r>
-              <a:rPr lang="en-US" dirty="0" smtClean="0"/>
-              <a:t>Model did not complete </a:t>
-            </a:r>
-          </a:p>
-          <a:p>
-            <a:r>
-              <a:rPr lang="en-US" dirty="0" smtClean="0"/>
-              <a:t>Run time over 20 hours</a:t>
-            </a:r>
-            <a:endParaRPr lang="en-US" dirty="0"/>
-          </a:p>
-        </p:txBody>
-      </p:sp>
-      <p:pic>
-        <p:nvPicPr>
-          <p:cNvPr id="5123" name="Picture 3" descr="D:\Documents\School\UCI Data Analytics Boot Camp\Projects Research\Project 4 Research\Stock Images\[Custom - 463x309] pexels-bentonphotocinema-1095601.jpg"/>
-          <p:cNvPicPr>
-            <a:picLocks noChangeAspect="1" noChangeArrowheads="1"/>
-          </p:cNvPicPr>
-          <p:nvPr/>
-        </p:nvPicPr>
-        <p:blipFill>
-          <a:blip r:embed="rId2">
-            <a:extLst>
-              <a:ext uri="{28A0092B-C50C-407E-A947-70E740481C1C}">
-                <a14:useLocalDpi xmlns:a14="http://schemas.microsoft.com/office/drawing/2010/main" val="0"/>
-              </a:ext>
-            </a:extLst>
-          </a:blip>
-          <a:srcRect/>
-          <a:stretch>
-            <a:fillRect/>
-          </a:stretch>
-        </p:blipFill>
-        <p:spPr bwMode="auto">
-          <a:xfrm>
-            <a:off x="1845818" y="2743200"/>
-            <a:ext cx="5880100" cy="3924300"/>
-          </a:xfrm>
-          <a:prstGeom prst="rect">
-            <a:avLst/>
-          </a:prstGeom>
-          <a:noFill/>
-          <a:extLst>
-            <a:ext uri="{909E8E84-426E-40DD-AFC4-6F175D3DCCD1}">
-              <a14:hiddenFill xmlns:a14="http://schemas.microsoft.com/office/drawing/2010/main">
-                <a:solidFill>
-                  <a:srgbClr val="FFFFFF"/>
-                </a:solidFill>
-              </a14:hiddenFill>
-            </a:ext>
-          </a:extLst>
-        </p:spPr>
-      </p:pic>
-    </p:spTree>
-    <p:extLst>
-      <p:ext uri="{BB962C8B-B14F-4D97-AF65-F5344CB8AC3E}">
-        <p14:creationId xmlns:p14="http://schemas.microsoft.com/office/powerpoint/2010/main" val="3736660283"/>
-      </p:ext>
-    </p:extLst>
-  </p:cSld>
-  <p:clrMapOvr>
-    <a:masterClrMapping/>
-  </p:clrMapOvr>
-  <p:timing>
-    <p:tnLst>
-      <p:par>
-        <p:cTn id="1" dur="indefinite" restart="never" nodeType="tmRoot"/>
-      </p:par>
-    </p:tnLst>
-  </p:timing>
-</p:sld>
-</file>
-
-<file path=ppt/slides/slide11.xml><?xml version="1.0" encoding="utf-8"?>
-<p:sld xmlns:a="http://schemas.openxmlformats.org/drawingml/2006/main" xmlns:r="http://schemas.openxmlformats.org/officeDocument/2006/relationships" xmlns:p="http://schemas.openxmlformats.org/presentationml/2006/main">
-  <p:cSld>
-    <p:spTree>
-      <p:nvGrpSpPr>
-        <p:cNvPr id="1" name=""/>
-        <p:cNvGrpSpPr/>
-        <p:nvPr/>
-      </p:nvGrpSpPr>
-      <p:grpSpPr>
-        <a:xfrm>
-          <a:off x="0" y="0"/>
-          <a:ext cx="0" cy="0"/>
-          <a:chOff x="0" y="0"/>
-          <a:chExt cx="0" cy="0"/>
-        </a:xfrm>
-      </p:grpSpPr>
-      <p:sp>
-        <p:nvSpPr>
-          <p:cNvPr id="2" name="Title 1"/>
-          <p:cNvSpPr>
-            <a:spLocks noGrp="1"/>
-          </p:cNvSpPr>
-          <p:nvPr>
-            <p:ph type="title"/>
-          </p:nvPr>
-        </p:nvSpPr>
-        <p:spPr/>
-        <p:txBody>
-          <a:bodyPr/>
-          <a:lstStyle/>
-          <a:p>
-            <a:pPr algn="l"/>
-            <a:r>
-              <a:rPr lang="en-US" cap="small" dirty="0" smtClean="0">
-                <a:latin typeface="Impact" panose="020B0806030902050204" pitchFamily="34" charset="0"/>
-              </a:rPr>
               <a:t>Logistic Regression</a:t>
             </a:r>
             <a:endParaRPr lang="en-US" cap="small" dirty="0">
@@ -3782,7 +3644,7 @@
 </p:sld>
 </file>
 
-<file path=ppt/slides/slide12.xml><?xml version="1.0" encoding="utf-8"?>
+<file path=ppt/slides/slide11.xml><?xml version="1.0" encoding="utf-8"?>
 <p:sld xmlns:a="http://schemas.openxmlformats.org/drawingml/2006/main" xmlns:r="http://schemas.openxmlformats.org/officeDocument/2006/relationships" xmlns:p="http://schemas.openxmlformats.org/presentationml/2006/main">
   <p:cSld>
     <p:spTree>
@@ -4204,7 +4066,7 @@
 </p:sld>
 </file>
 
-<file path=ppt/slides/slide13.xml><?xml version="1.0" encoding="utf-8"?>
+<file path=ppt/slides/slide12.xml><?xml version="1.0" encoding="utf-8"?>
 <p:sld xmlns:a="http://schemas.openxmlformats.org/drawingml/2006/main" xmlns:r="http://schemas.openxmlformats.org/officeDocument/2006/relationships" xmlns:p="http://schemas.openxmlformats.org/presentationml/2006/main">
   <p:cSld>
     <p:spTree>
@@ -5143,21 +5005,8 @@
             <a:pPr lvl="2"/>
             <a:r>
               <a:rPr lang="en-US" dirty="0" smtClean="0"/>
-              <a:t>For example:</a:t>
-            </a:r>
-            <a:r>
-              <a:rPr lang="en-US" dirty="0" smtClean="0"/>
-              <a:t> </a:t>
-            </a:r>
-            <a:r>
-              <a:rPr lang="en-US" dirty="0" smtClean="0"/>
-              <a:t>Airbus and Airbus </a:t>
-            </a:r>
-            <a:r>
-              <a:rPr lang="en-US" dirty="0" smtClean="0"/>
-              <a:t>SAS</a:t>
-            </a:r>
-            <a:endParaRPr lang="en-US" dirty="0" smtClean="0"/>
+              <a:t>For example: Airbus and Airbus SAS</a:t>
+            </a:r>
           </a:p>
           <a:p>
             <a:r>
@@ -5309,7 +5158,6 @@
               <a:rPr lang="en-US" dirty="0" smtClean="0"/>
               <a:t>Not delayed otherwise</a:t>
             </a:r>
-            <a:endParaRPr lang="en-US" dirty="0" smtClean="0"/>
           </a:p>
           <a:p>
             <a:endParaRPr lang="en-US" dirty="0" smtClean="0"/>
@@ -5717,13 +5565,13 @@
           <p:nvPr>
             <p:extLst>
               <p:ext uri="{D42A27DB-BD31-4B8C-83A1-F6EECF244321}">
-                <p14:modId xmlns:p14="http://schemas.microsoft.com/office/powerpoint/2010/main" val="2547548901"/>
+                <p14:modId xmlns:p14="http://schemas.microsoft.com/office/powerpoint/2010/main" val="4259125409"/>
               </p:ext>
             </p:extLst>
           </p:nvPr>
         </p:nvGraphicFramePr>
         <p:xfrm>
-          <a:off x="1219200" y="5715000"/>
+          <a:off x="1752600" y="5715000"/>
           <a:ext cx="5791201" cy="822960"/>
         </p:xfrm>
         <a:graphic>
@@ -5854,6 +5702,10 @@
                     <a:lstStyle/>
                     <a:p>
                       <a:pPr algn="ctr"/>
+                      <a:r>
+                        <a:rPr lang="en-US" sz="1200" dirty="0" smtClean="0"/>
+                        <a:t>0.5970</a:t>
+                      </a:r>
                       <a:endParaRPr lang="en-US" sz="1200" dirty="0"/>
                     </a:p>
                   </a:txBody>
@@ -5911,6 +5763,10 @@
                     <a:lstStyle/>
                     <a:p>
                       <a:pPr algn="ctr"/>
+                      <a:r>
+                        <a:rPr lang="en-US" sz="1200" dirty="0" smtClean="0"/>
+                        <a:t>0.5968</a:t>
+                      </a:r>
                       <a:endParaRPr lang="en-US" sz="1200" dirty="0"/>
                     </a:p>
                   </a:txBody>
@@ -5988,21 +5844,21 @@
       </p:sp>
       <p:graphicFrame>
         <p:nvGraphicFramePr>
-          <p:cNvPr id="3" name="Table 2"/>
+          <p:cNvPr id="6" name="Table 5"/>
           <p:cNvGraphicFramePr>
             <a:graphicFrameLocks noGrp="1"/>
           </p:cNvGraphicFramePr>
           <p:nvPr>
             <p:extLst>
               <p:ext uri="{D42A27DB-BD31-4B8C-83A1-F6EECF244321}">
-                <p14:modId xmlns:p14="http://schemas.microsoft.com/office/powerpoint/2010/main" val="2249644716"/>
+                <p14:modId xmlns:p14="http://schemas.microsoft.com/office/powerpoint/2010/main" val="169138478"/>
               </p:ext>
             </p:extLst>
           </p:nvPr>
         </p:nvGraphicFramePr>
         <p:xfrm>
-          <a:off x="609600" y="2627868"/>
-          <a:ext cx="7848600" cy="1381760"/>
+          <a:off x="457200" y="2057400"/>
+          <a:ext cx="8229600" cy="1483360"/>
         </p:xfrm>
         <a:graphic>
           <a:graphicData uri="http://schemas.openxmlformats.org/drawingml/2006/table">
@@ -6011,9 +5867,10 @@
                 <a:tableStyleId>{5C22544A-7EE6-4342-B048-85BDC9FD1C3A}</a:tableStyleId>
               </a:tblPr>
               <a:tblGrid>
-                <a:gridCol w="2616200"/>
-                <a:gridCol w="2616200"/>
-                <a:gridCol w="2616200"/>
+                <a:gridCol w="2057400"/>
+                <a:gridCol w="2057400"/>
+                <a:gridCol w="2057400"/>
+                <a:gridCol w="2057400"/>
               </a:tblGrid>
               <a:tr h="370840">
                 <a:tc>
@@ -6022,10 +5879,10 @@
                     <a:lstStyle/>
                     <a:p>
                       <a:r>
-                        <a:rPr lang="en-US" dirty="0" smtClean="0"/>
-                        <a:t>Configuration</a:t>
-                      </a:r>
-                      <a:endParaRPr lang="en-US" dirty="0"/>
+                        <a:rPr lang="en-US" sz="1600" dirty="0" smtClean="0"/>
+                        <a:t>Label</a:t>
+                      </a:r>
+                      <a:endParaRPr lang="en-US" sz="1600" dirty="0"/>
                     </a:p>
                   </a:txBody>
                   <a:tcPr/>
@@ -6037,10 +5894,10 @@
                     <a:p>
                       <a:pPr algn="ctr"/>
                       <a:r>
-                        <a:rPr lang="en-US" dirty="0" smtClean="0"/>
-                        <a:t>Training Accuracy</a:t>
-                      </a:r>
-                      <a:endParaRPr lang="en-US" dirty="0"/>
+                        <a:rPr lang="en-US" sz="1600" dirty="0" smtClean="0"/>
+                        <a:t>Precision</a:t>
+                      </a:r>
+                      <a:endParaRPr lang="en-US" sz="1600" dirty="0"/>
                     </a:p>
                   </a:txBody>
                   <a:tcPr/>
@@ -6052,10 +5909,25 @@
                     <a:p>
                       <a:pPr algn="ctr"/>
                       <a:r>
-                        <a:rPr lang="en-US" dirty="0" smtClean="0"/>
-                        <a:t>Test Accuracy</a:t>
-                      </a:r>
-                      <a:endParaRPr lang="en-US" dirty="0"/>
+                        <a:rPr lang="en-US" sz="1600" dirty="0" smtClean="0"/>
+                        <a:t>Recall</a:t>
+                      </a:r>
+                      <a:endParaRPr lang="en-US" sz="1600" dirty="0"/>
+                    </a:p>
+                  </a:txBody>
+                  <a:tcPr/>
+                </a:tc>
+                <a:tc>
+                  <a:txBody>
+                    <a:bodyPr/>
+                    <a:lstStyle/>
+                    <a:p>
+                      <a:pPr algn="ctr"/>
+                      <a:r>
+                        <a:rPr lang="en-US" sz="1600" dirty="0" smtClean="0"/>
+                        <a:t>F1</a:t>
+                      </a:r>
+                      <a:endParaRPr lang="en-US" sz="1600" dirty="0"/>
                     </a:p>
                   </a:txBody>
                   <a:tcPr/>
@@ -6068,8 +5940,23 @@
                     <a:lstStyle/>
                     <a:p>
                       <a:r>
+                        <a:rPr lang="en-US" sz="1600" dirty="0" smtClean="0"/>
+                        <a:t>0</a:t>
+                      </a:r>
+                      <a:endParaRPr lang="en-US" sz="1600" dirty="0"/>
+                    </a:p>
+                  </a:txBody>
+                  <a:tcPr/>
+                </a:tc>
+                <a:tc>
+                  <a:txBody>
+                    <a:bodyPr/>
+                    <a:lstStyle/>
+                    <a:p>
+                      <a:pPr algn="ctr"/>
+                      <a:r>
                         <a:rPr lang="en-US" dirty="0" smtClean="0"/>
-                        <a:t>Full forest</a:t>
+                        <a:t>0.85</a:t>
                       </a:r>
                       <a:endParaRPr lang="en-US" dirty="0"/>
                     </a:p>
@@ -6084,7 +5971,7 @@
                       <a:pPr algn="ctr"/>
                       <a:r>
                         <a:rPr lang="en-US" dirty="0" smtClean="0"/>
-                        <a:t>0.9999</a:t>
+                        <a:t>0.99</a:t>
                       </a:r>
                       <a:endParaRPr lang="en-US" dirty="0"/>
                     </a:p>
@@ -6099,7 +5986,7 @@
                       <a:pPr algn="ctr"/>
                       <a:r>
                         <a:rPr lang="en-US" dirty="0" smtClean="0"/>
-                        <a:t>0.8424</a:t>
+                        <a:t>0.91</a:t>
                       </a:r>
                       <a:endParaRPr lang="en-US" dirty="0"/>
                     </a:p>
@@ -6114,16 +6001,23 @@
                     <a:lstStyle/>
                     <a:p>
                       <a:r>
+                        <a:rPr lang="en-US" sz="1600" dirty="0" smtClean="0"/>
+                        <a:t>1</a:t>
+                      </a:r>
+                      <a:endParaRPr lang="en-US" sz="1600" dirty="0"/>
+                    </a:p>
+                  </a:txBody>
+                  <a:tcPr/>
+                </a:tc>
+                <a:tc>
+                  <a:txBody>
+                    <a:bodyPr/>
+                    <a:lstStyle/>
+                    <a:p>
+                      <a:pPr algn="ctr"/>
+                      <a:r>
                         <a:rPr lang="en-US" dirty="0" smtClean="0"/>
-                        <a:t>Random</a:t>
-                      </a:r>
-                      <a:r>
-                        <a:rPr lang="en-US" baseline="0" dirty="0" smtClean="0"/>
-                        <a:t> Search </a:t>
-                      </a:r>
-                      <a:r>
-                        <a:rPr lang="en-US" baseline="0" dirty="0" err="1" smtClean="0"/>
-                        <a:t>Hyperparameters</a:t>
+                        <a:t>0.36</a:t>
                       </a:r>
                       <a:endParaRPr lang="en-US" dirty="0"/>
                     </a:p>
@@ -6138,7 +6032,7 @@
                       <a:pPr algn="ctr"/>
                       <a:r>
                         <a:rPr lang="en-US" dirty="0" smtClean="0"/>
-                        <a:t>0.5937</a:t>
+                        <a:t>0.06</a:t>
                       </a:r>
                       <a:endParaRPr lang="en-US" dirty="0"/>
                     </a:p>
@@ -6153,7 +6047,60 @@
                       <a:pPr algn="ctr"/>
                       <a:r>
                         <a:rPr lang="en-US" dirty="0" smtClean="0"/>
-                        <a:t>0.5968</a:t>
+                        <a:t>0.11</a:t>
+                      </a:r>
+                      <a:endParaRPr lang="en-US" dirty="0"/>
+                    </a:p>
+                  </a:txBody>
+                  <a:tcPr/>
+                </a:tc>
+              </a:tr>
+              <a:tr h="370840">
+                <a:tc>
+                  <a:txBody>
+                    <a:bodyPr/>
+                    <a:lstStyle/>
+                    <a:p>
+                      <a:r>
+                        <a:rPr lang="en-US" sz="1600" dirty="0" smtClean="0"/>
+                        <a:t>Accuracy</a:t>
+                      </a:r>
+                      <a:endParaRPr lang="en-US" sz="1600" dirty="0"/>
+                    </a:p>
+                  </a:txBody>
+                  <a:tcPr/>
+                </a:tc>
+                <a:tc>
+                  <a:txBody>
+                    <a:bodyPr/>
+                    <a:lstStyle/>
+                    <a:p>
+                      <a:pPr algn="ctr"/>
+                      <a:endParaRPr lang="en-US" dirty="0"/>
+                    </a:p>
+                  </a:txBody>
+                  <a:tcPr/>
+                </a:tc>
+                <a:tc>
+                  <a:txBody>
+                    <a:bodyPr/>
+                    <a:lstStyle/>
+                    <a:p>
+                      <a:pPr algn="ctr"/>
+                      <a:endParaRPr lang="en-US" dirty="0"/>
+                    </a:p>
+                  </a:txBody>
+                  <a:tcPr/>
+                </a:tc>
+                <a:tc>
+                  <a:txBody>
+                    <a:bodyPr/>
+                    <a:lstStyle/>
+                    <a:p>
+                      <a:pPr algn="ctr"/>
+                      <a:r>
+                        <a:rPr lang="en-US" dirty="0" smtClean="0"/>
+                        <a:t>0.84</a:t>
                       </a:r>
                       <a:endParaRPr lang="en-US" dirty="0"/>
                     </a:p>
@@ -6165,16 +6112,476 @@
           </a:graphicData>
         </a:graphic>
       </p:graphicFrame>
-      <p:sp>
-        <p:nvSpPr>
-          <p:cNvPr id="4" name="TextBox 3"/>
+      <p:graphicFrame>
+        <p:nvGraphicFramePr>
+          <p:cNvPr id="8" name="Table 7"/>
+          <p:cNvGraphicFramePr>
+            <a:graphicFrameLocks noGrp="1"/>
+          </p:cNvGraphicFramePr>
+          <p:nvPr>
+            <p:extLst>
+              <p:ext uri="{D42A27DB-BD31-4B8C-83A1-F6EECF244321}">
+                <p14:modId xmlns:p14="http://schemas.microsoft.com/office/powerpoint/2010/main" val="2443065806"/>
+              </p:ext>
+            </p:extLst>
+          </p:nvPr>
+        </p:nvGraphicFramePr>
+        <p:xfrm>
+          <a:off x="457200" y="2057400"/>
+          <a:ext cx="2057400" cy="1483360"/>
+        </p:xfrm>
+        <a:graphic>
+          <a:graphicData uri="http://schemas.openxmlformats.org/drawingml/2006/table">
+            <a:tbl>
+              <a:tblPr firstRow="1" bandRow="1">
+                <a:tableStyleId>{5C22544A-7EE6-4342-B048-85BDC9FD1C3A}</a:tableStyleId>
+              </a:tblPr>
+              <a:tblGrid>
+                <a:gridCol w="2057400"/>
+              </a:tblGrid>
+              <a:tr h="370840">
+                <a:tc>
+                  <a:txBody>
+                    <a:bodyPr/>
+                    <a:lstStyle/>
+                    <a:p>
+                      <a:r>
+                        <a:rPr lang="en-US" sz="1600" dirty="0" smtClean="0"/>
+                        <a:t>Label</a:t>
+                      </a:r>
+                      <a:endParaRPr lang="en-US" sz="1600" dirty="0"/>
+                    </a:p>
+                  </a:txBody>
+                  <a:tcPr/>
+                </a:tc>
+              </a:tr>
+              <a:tr h="370840">
+                <a:tc>
+                  <a:txBody>
+                    <a:bodyPr/>
+                    <a:lstStyle/>
+                    <a:p>
+                      <a:r>
+                        <a:rPr lang="en-US" sz="1600" dirty="0" smtClean="0"/>
+                        <a:t>0</a:t>
+                      </a:r>
+                      <a:endParaRPr lang="en-US" sz="1600" dirty="0"/>
+                    </a:p>
+                  </a:txBody>
+                  <a:tcPr/>
+                </a:tc>
+              </a:tr>
+              <a:tr h="370840">
+                <a:tc>
+                  <a:txBody>
+                    <a:bodyPr/>
+                    <a:lstStyle/>
+                    <a:p>
+                      <a:r>
+                        <a:rPr lang="en-US" sz="1600" dirty="0" smtClean="0"/>
+                        <a:t>1</a:t>
+                      </a:r>
+                      <a:endParaRPr lang="en-US" sz="1600" dirty="0"/>
+                    </a:p>
+                  </a:txBody>
+                  <a:tcPr/>
+                </a:tc>
+              </a:tr>
+              <a:tr h="370840">
+                <a:tc>
+                  <a:txBody>
+                    <a:bodyPr/>
+                    <a:lstStyle/>
+                    <a:p>
+                      <a:r>
+                        <a:rPr lang="en-US" sz="1600" dirty="0" smtClean="0"/>
+                        <a:t>Accuracy</a:t>
+                      </a:r>
+                      <a:endParaRPr lang="en-US" sz="1600" dirty="0"/>
+                    </a:p>
+                  </a:txBody>
+                  <a:tcPr/>
+                </a:tc>
+              </a:tr>
+            </a:tbl>
+          </a:graphicData>
+        </a:graphic>
+      </p:graphicFrame>
+      <p:graphicFrame>
+        <p:nvGraphicFramePr>
+          <p:cNvPr id="9" name="Table 8"/>
+          <p:cNvGraphicFramePr>
+            <a:graphicFrameLocks noGrp="1"/>
+          </p:cNvGraphicFramePr>
+          <p:nvPr>
+            <p:extLst>
+              <p:ext uri="{D42A27DB-BD31-4B8C-83A1-F6EECF244321}">
+                <p14:modId xmlns:p14="http://schemas.microsoft.com/office/powerpoint/2010/main" val="124945657"/>
+              </p:ext>
+            </p:extLst>
+          </p:nvPr>
+        </p:nvGraphicFramePr>
+        <p:xfrm>
+          <a:off x="457200" y="4343400"/>
+          <a:ext cx="8229600" cy="1483360"/>
+        </p:xfrm>
+        <a:graphic>
+          <a:graphicData uri="http://schemas.openxmlformats.org/drawingml/2006/table">
+            <a:tbl>
+              <a:tblPr firstRow="1" bandRow="1">
+                <a:tableStyleId>{5C22544A-7EE6-4342-B048-85BDC9FD1C3A}</a:tableStyleId>
+              </a:tblPr>
+              <a:tblGrid>
+                <a:gridCol w="2057400"/>
+                <a:gridCol w="2057400"/>
+                <a:gridCol w="2057400"/>
+                <a:gridCol w="2057400"/>
+              </a:tblGrid>
+              <a:tr h="370840">
+                <a:tc>
+                  <a:txBody>
+                    <a:bodyPr/>
+                    <a:lstStyle/>
+                    <a:p>
+                      <a:r>
+                        <a:rPr lang="en-US" sz="1600" dirty="0" smtClean="0"/>
+                        <a:t>Label</a:t>
+                      </a:r>
+                      <a:endParaRPr lang="en-US" sz="1600" dirty="0"/>
+                    </a:p>
+                  </a:txBody>
+                  <a:tcPr/>
+                </a:tc>
+                <a:tc>
+                  <a:txBody>
+                    <a:bodyPr/>
+                    <a:lstStyle/>
+                    <a:p>
+                      <a:pPr algn="ctr"/>
+                      <a:r>
+                        <a:rPr lang="en-US" sz="1600" dirty="0" smtClean="0"/>
+                        <a:t>Precision</a:t>
+                      </a:r>
+                      <a:endParaRPr lang="en-US" sz="1600" dirty="0"/>
+                    </a:p>
+                  </a:txBody>
+                  <a:tcPr/>
+                </a:tc>
+                <a:tc>
+                  <a:txBody>
+                    <a:bodyPr/>
+                    <a:lstStyle/>
+                    <a:p>
+                      <a:pPr algn="ctr"/>
+                      <a:r>
+                        <a:rPr lang="en-US" sz="1600" dirty="0" smtClean="0"/>
+                        <a:t>Recall</a:t>
+                      </a:r>
+                      <a:endParaRPr lang="en-US" sz="1600" dirty="0"/>
+                    </a:p>
+                  </a:txBody>
+                  <a:tcPr/>
+                </a:tc>
+                <a:tc>
+                  <a:txBody>
+                    <a:bodyPr/>
+                    <a:lstStyle/>
+                    <a:p>
+                      <a:pPr algn="ctr"/>
+                      <a:r>
+                        <a:rPr lang="en-US" sz="1600" dirty="0" smtClean="0"/>
+                        <a:t>F1</a:t>
+                      </a:r>
+                      <a:endParaRPr lang="en-US" sz="1600" dirty="0"/>
+                    </a:p>
+                  </a:txBody>
+                  <a:tcPr/>
+                </a:tc>
+              </a:tr>
+              <a:tr h="370840">
+                <a:tc>
+                  <a:txBody>
+                    <a:bodyPr/>
+                    <a:lstStyle/>
+                    <a:p>
+                      <a:r>
+                        <a:rPr lang="en-US" sz="1600" dirty="0" smtClean="0"/>
+                        <a:t>0</a:t>
+                      </a:r>
+                      <a:endParaRPr lang="en-US" sz="1600" dirty="0"/>
+                    </a:p>
+                  </a:txBody>
+                  <a:tcPr/>
+                </a:tc>
+                <a:tc>
+                  <a:txBody>
+                    <a:bodyPr/>
+                    <a:lstStyle/>
+                    <a:p>
+                      <a:pPr algn="ctr"/>
+                      <a:r>
+                        <a:rPr lang="en-US" dirty="0" smtClean="0"/>
+                        <a:t>0.88</a:t>
+                      </a:r>
+                      <a:endParaRPr lang="en-US" dirty="0"/>
+                    </a:p>
+                  </a:txBody>
+                  <a:tcPr/>
+                </a:tc>
+                <a:tc>
+                  <a:txBody>
+                    <a:bodyPr/>
+                    <a:lstStyle/>
+                    <a:p>
+                      <a:pPr algn="ctr"/>
+                      <a:r>
+                        <a:rPr lang="en-US" dirty="0" smtClean="0"/>
+                        <a:t>0.59</a:t>
+                      </a:r>
+                      <a:endParaRPr lang="en-US" dirty="0"/>
+                    </a:p>
+                  </a:txBody>
+                  <a:tcPr/>
+                </a:tc>
+                <a:tc>
+                  <a:txBody>
+                    <a:bodyPr/>
+                    <a:lstStyle/>
+                    <a:p>
+                      <a:pPr algn="ctr"/>
+                      <a:r>
+                        <a:rPr lang="en-US" dirty="0" smtClean="0"/>
+                        <a:t>0.71</a:t>
+                      </a:r>
+                      <a:endParaRPr lang="en-US" dirty="0"/>
+                    </a:p>
+                  </a:txBody>
+                  <a:tcPr/>
+                </a:tc>
+              </a:tr>
+              <a:tr h="370840">
+                <a:tc>
+                  <a:txBody>
+                    <a:bodyPr/>
+                    <a:lstStyle/>
+                    <a:p>
+                      <a:r>
+                        <a:rPr lang="en-US" sz="1600" dirty="0" smtClean="0"/>
+                        <a:t>1</a:t>
+                      </a:r>
+                      <a:endParaRPr lang="en-US" sz="1600" dirty="0"/>
+                    </a:p>
+                  </a:txBody>
+                  <a:tcPr/>
+                </a:tc>
+                <a:tc>
+                  <a:txBody>
+                    <a:bodyPr/>
+                    <a:lstStyle/>
+                    <a:p>
+                      <a:pPr algn="ctr"/>
+                      <a:r>
+                        <a:rPr lang="en-US" dirty="0" smtClean="0"/>
+                        <a:t>0.22</a:t>
+                      </a:r>
+                      <a:endParaRPr lang="en-US" dirty="0"/>
+                    </a:p>
+                  </a:txBody>
+                  <a:tcPr/>
+                </a:tc>
+                <a:tc>
+                  <a:txBody>
+                    <a:bodyPr/>
+                    <a:lstStyle/>
+                    <a:p>
+                      <a:pPr algn="ctr"/>
+                      <a:r>
+                        <a:rPr lang="en-US" dirty="0" smtClean="0"/>
+                        <a:t>0.60</a:t>
+                      </a:r>
+                      <a:endParaRPr lang="en-US" dirty="0"/>
+                    </a:p>
+                  </a:txBody>
+                  <a:tcPr/>
+                </a:tc>
+                <a:tc>
+                  <a:txBody>
+                    <a:bodyPr/>
+                    <a:lstStyle/>
+                    <a:p>
+                      <a:pPr algn="ctr"/>
+                      <a:r>
+                        <a:rPr lang="en-US" dirty="0" smtClean="0"/>
+                        <a:t>0.32</a:t>
+                      </a:r>
+                      <a:endParaRPr lang="en-US" dirty="0"/>
+                    </a:p>
+                  </a:txBody>
+                  <a:tcPr/>
+                </a:tc>
+              </a:tr>
+              <a:tr h="370840">
+                <a:tc>
+                  <a:txBody>
+                    <a:bodyPr/>
+                    <a:lstStyle/>
+                    <a:p>
+                      <a:r>
+                        <a:rPr lang="en-US" sz="1600" dirty="0" smtClean="0"/>
+                        <a:t>Accuracy</a:t>
+                      </a:r>
+                      <a:endParaRPr lang="en-US" sz="1600" dirty="0"/>
+                    </a:p>
+                  </a:txBody>
+                  <a:tcPr/>
+                </a:tc>
+                <a:tc>
+                  <a:txBody>
+                    <a:bodyPr/>
+                    <a:lstStyle/>
+                    <a:p>
+                      <a:pPr algn="ctr"/>
+                      <a:endParaRPr lang="en-US" dirty="0"/>
+                    </a:p>
+                  </a:txBody>
+                  <a:tcPr/>
+                </a:tc>
+                <a:tc>
+                  <a:txBody>
+                    <a:bodyPr/>
+                    <a:lstStyle/>
+                    <a:p>
+                      <a:pPr algn="ctr"/>
+                      <a:endParaRPr lang="en-US" dirty="0"/>
+                    </a:p>
+                  </a:txBody>
+                  <a:tcPr/>
+                </a:tc>
+                <a:tc>
+                  <a:txBody>
+                    <a:bodyPr/>
+                    <a:lstStyle/>
+                    <a:p>
+                      <a:pPr algn="ctr"/>
+                      <a:r>
+                        <a:rPr lang="en-US" dirty="0" smtClean="0"/>
+                        <a:t>0.59</a:t>
+                      </a:r>
+                      <a:endParaRPr lang="en-US" dirty="0"/>
+                    </a:p>
+                  </a:txBody>
+                  <a:tcPr/>
+                </a:tc>
+              </a:tr>
+            </a:tbl>
+          </a:graphicData>
+        </a:graphic>
+      </p:graphicFrame>
+      <p:graphicFrame>
+        <p:nvGraphicFramePr>
+          <p:cNvPr id="10" name="Table 9"/>
+          <p:cNvGraphicFramePr>
+            <a:graphicFrameLocks noGrp="1"/>
+          </p:cNvGraphicFramePr>
+          <p:nvPr>
+            <p:extLst>
+              <p:ext uri="{D42A27DB-BD31-4B8C-83A1-F6EECF244321}">
+                <p14:modId xmlns:p14="http://schemas.microsoft.com/office/powerpoint/2010/main" val="974869510"/>
+              </p:ext>
+            </p:extLst>
+          </p:nvPr>
+        </p:nvGraphicFramePr>
+        <p:xfrm>
+          <a:off x="457200" y="4343400"/>
+          <a:ext cx="2057400" cy="1483360"/>
+        </p:xfrm>
+        <a:graphic>
+          <a:graphicData uri="http://schemas.openxmlformats.org/drawingml/2006/table">
+            <a:tbl>
+              <a:tblPr firstRow="1" bandRow="1">
+                <a:tableStyleId>{5C22544A-7EE6-4342-B048-85BDC9FD1C3A}</a:tableStyleId>
+              </a:tblPr>
+              <a:tblGrid>
+                <a:gridCol w="2057400"/>
+              </a:tblGrid>
+              <a:tr h="370840">
+                <a:tc>
+                  <a:txBody>
+                    <a:bodyPr/>
+                    <a:lstStyle/>
+                    <a:p>
+                      <a:r>
+                        <a:rPr lang="en-US" sz="1600" dirty="0" smtClean="0"/>
+                        <a:t>Label</a:t>
+                      </a:r>
+                      <a:endParaRPr lang="en-US" sz="1600" dirty="0"/>
+                    </a:p>
+                  </a:txBody>
+                  <a:tcPr/>
+                </a:tc>
+              </a:tr>
+              <a:tr h="370840">
+                <a:tc>
+                  <a:txBody>
+                    <a:bodyPr/>
+                    <a:lstStyle/>
+                    <a:p>
+                      <a:r>
+                        <a:rPr lang="en-US" sz="1600" dirty="0" smtClean="0"/>
+                        <a:t>0</a:t>
+                      </a:r>
+                      <a:endParaRPr lang="en-US" sz="1600" dirty="0"/>
+                    </a:p>
+                  </a:txBody>
+                  <a:tcPr/>
+                </a:tc>
+              </a:tr>
+              <a:tr h="370840">
+                <a:tc>
+                  <a:txBody>
+                    <a:bodyPr/>
+                    <a:lstStyle/>
+                    <a:p>
+                      <a:r>
+                        <a:rPr lang="en-US" sz="1600" dirty="0" smtClean="0"/>
+                        <a:t>1</a:t>
+                      </a:r>
+                      <a:endParaRPr lang="en-US" sz="1600" dirty="0"/>
+                    </a:p>
+                  </a:txBody>
+                  <a:tcPr/>
+                </a:tc>
+              </a:tr>
+              <a:tr h="370840">
+                <a:tc>
+                  <a:txBody>
+                    <a:bodyPr/>
+                    <a:lstStyle/>
+                    <a:p>
+                      <a:r>
+                        <a:rPr lang="en-US" sz="1600" dirty="0" smtClean="0"/>
+                        <a:t>Accuracy</a:t>
+                      </a:r>
+                      <a:endParaRPr lang="en-US" sz="1600" dirty="0"/>
+                    </a:p>
+                  </a:txBody>
+                  <a:tcPr/>
+                </a:tc>
+              </a:tr>
+            </a:tbl>
+          </a:graphicData>
+        </a:graphic>
+      </p:graphicFrame>
+      <p:sp>
+        <p:nvSpPr>
+          <p:cNvPr id="11" name="TextBox 10"/>
           <p:cNvSpPr txBox="1"/>
           <p:nvPr/>
         </p:nvSpPr>
         <p:spPr>
           <a:xfrm>
-            <a:off x="914400" y="4355068"/>
-            <a:ext cx="7010400" cy="369332"/>
+            <a:off x="457200" y="1600200"/>
+            <a:ext cx="4648200" cy="381000"/>
           </a:xfrm>
           <a:prstGeom prst="rect">
             <a:avLst/>
@@ -6187,26 +6594,9 @@
           </a:bodyPr>
           <a:lstStyle/>
           <a:p>
-            <a:pPr algn="ctr"/>
             <a:r>
               <a:rPr lang="en-US" dirty="0" smtClean="0"/>
-              <a:t>Additional </a:t>
-            </a:r>
-            <a:r>
-              <a:rPr lang="en-US" dirty="0" err="1" smtClean="0"/>
-              <a:t>hyperparameters</a:t>
-            </a:r>
-            <a:r>
-              <a:rPr lang="en-US" dirty="0" smtClean="0"/>
-              <a:t> overcorrected overfitting into </a:t>
-            </a:r>
-            <a:r>
-              <a:rPr lang="en-US" dirty="0" err="1" smtClean="0"/>
-              <a:t>underfitting</a:t>
-            </a:r>
-            <a:r>
-              <a:rPr lang="en-US" dirty="0" smtClean="0"/>
-              <a:t>.</a:t>
+              <a:t>Binary Classification, full tree</a:t>
             </a:r>
             <a:endParaRPr lang="en-US" dirty="0"/>
           </a:p>
@@ -6214,14 +6604,14 @@
       </p:sp>
       <p:sp>
         <p:nvSpPr>
-          <p:cNvPr id="5" name="TextBox 4"/>
+          <p:cNvPr id="12" name="TextBox 11"/>
           <p:cNvSpPr txBox="1"/>
           <p:nvPr/>
         </p:nvSpPr>
         <p:spPr>
           <a:xfrm>
-            <a:off x="685800" y="1905000"/>
-            <a:ext cx="7696200" cy="369332"/>
+            <a:off x="457200" y="3886200"/>
+            <a:ext cx="8229600" cy="369332"/>
           </a:xfrm>
           <a:prstGeom prst="rect">
             <a:avLst/>
@@ -6236,7 +6626,19 @@
           <a:p>
             <a:r>
               <a:rPr lang="en-US" dirty="0" smtClean="0"/>
-              <a:t>Accuracy results for binary classification:</a:t>
+              <a:t>Binary Classification, </a:t>
+            </a:r>
+            <a:r>
+              <a:rPr lang="en-US" dirty="0" err="1" smtClean="0"/>
+              <a:t>hyperparameters</a:t>
+            </a:r>
+            <a:r>
+              <a:rPr lang="en-US" dirty="0" smtClean="0"/>
+              <a:t> determined by </a:t>
+            </a:r>
+            <a:r>
+              <a:rPr lang="en-US" dirty="0" err="1" smtClean="0"/>
+              <a:t>RandomSearchCV</a:t>
             </a:r>
             <a:endParaRPr lang="en-US" dirty="0"/>
           </a:p>
@@ -6245,7 +6647,7 @@
     </p:spTree>
     <p:extLst>
       <p:ext uri="{BB962C8B-B14F-4D97-AF65-F5344CB8AC3E}">
-        <p14:creationId xmlns:p14="http://schemas.microsoft.com/office/powerpoint/2010/main" val="1110463231"/>
+        <p14:creationId xmlns:p14="http://schemas.microsoft.com/office/powerpoint/2010/main" val="2878103684"/>
       </p:ext>
     </p:extLst>
   </p:cSld>
@@ -6307,803 +6709,24 @@
           </a:p>
         </p:txBody>
       </p:sp>
-      <p:graphicFrame>
-        <p:nvGraphicFramePr>
-          <p:cNvPr id="6" name="Table 5"/>
-          <p:cNvGraphicFramePr>
-            <a:graphicFrameLocks noGrp="1"/>
-          </p:cNvGraphicFramePr>
-          <p:nvPr>
-            <p:extLst>
-              <p:ext uri="{D42A27DB-BD31-4B8C-83A1-F6EECF244321}">
-                <p14:modId xmlns:p14="http://schemas.microsoft.com/office/powerpoint/2010/main" val="169138478"/>
-              </p:ext>
-            </p:extLst>
-          </p:nvPr>
-        </p:nvGraphicFramePr>
-        <p:xfrm>
-          <a:off x="457200" y="2057400"/>
-          <a:ext cx="8229600" cy="1483360"/>
-        </p:xfrm>
-        <a:graphic>
-          <a:graphicData uri="http://schemas.openxmlformats.org/drawingml/2006/table">
-            <a:tbl>
-              <a:tblPr firstRow="1" bandRow="1">
-                <a:tableStyleId>{5C22544A-7EE6-4342-B048-85BDC9FD1C3A}</a:tableStyleId>
-              </a:tblPr>
-              <a:tblGrid>
-                <a:gridCol w="2057400"/>
-                <a:gridCol w="2057400"/>
-                <a:gridCol w="2057400"/>
-                <a:gridCol w="2057400"/>
-              </a:tblGrid>
-              <a:tr h="370840">
-                <a:tc>
-                  <a:txBody>
-                    <a:bodyPr/>
-                    <a:lstStyle/>
-                    <a:p>
-                      <a:r>
-                        <a:rPr lang="en-US" sz="1600" dirty="0" smtClean="0"/>
-                        <a:t>Label</a:t>
-                      </a:r>
-                      <a:endParaRPr lang="en-US" sz="1600" dirty="0"/>
-                    </a:p>
-                  </a:txBody>
-                  <a:tcPr/>
-                </a:tc>
-                <a:tc>
-                  <a:txBody>
-                    <a:bodyPr/>
-                    <a:lstStyle/>
-                    <a:p>
-                      <a:pPr algn="ctr"/>
-                      <a:r>
-                        <a:rPr lang="en-US" sz="1600" dirty="0" smtClean="0"/>
-                        <a:t>Precision</a:t>
-                      </a:r>
-                      <a:endParaRPr lang="en-US" sz="1600" dirty="0"/>
-                    </a:p>
-                  </a:txBody>
-                  <a:tcPr/>
-                </a:tc>
-                <a:tc>
-                  <a:txBody>
-                    <a:bodyPr/>
-                    <a:lstStyle/>
-                    <a:p>
-                      <a:pPr algn="ctr"/>
-                      <a:r>
-                        <a:rPr lang="en-US" sz="1600" dirty="0" smtClean="0"/>
-                        <a:t>Recall</a:t>
-                      </a:r>
-                      <a:endParaRPr lang="en-US" sz="1600" dirty="0"/>
-                    </a:p>
-                  </a:txBody>
-                  <a:tcPr/>
-                </a:tc>
-                <a:tc>
-                  <a:txBody>
-                    <a:bodyPr/>
-                    <a:lstStyle/>
-                    <a:p>
-                      <a:pPr algn="ctr"/>
-                      <a:r>
-                        <a:rPr lang="en-US" sz="1600" dirty="0" smtClean="0"/>
-                        <a:t>F1</a:t>
-                      </a:r>
-                      <a:endParaRPr lang="en-US" sz="1600" dirty="0"/>
-                    </a:p>
-                  </a:txBody>
-                  <a:tcPr/>
-                </a:tc>
-              </a:tr>
-              <a:tr h="370840">
-                <a:tc>
-                  <a:txBody>
-                    <a:bodyPr/>
-                    <a:lstStyle/>
-                    <a:p>
-                      <a:r>
-                        <a:rPr lang="en-US" sz="1600" dirty="0" smtClean="0"/>
-                        <a:t>0</a:t>
-                      </a:r>
-                      <a:endParaRPr lang="en-US" sz="1600" dirty="0"/>
-                    </a:p>
-                  </a:txBody>
-                  <a:tcPr/>
-                </a:tc>
-                <a:tc>
-                  <a:txBody>
-                    <a:bodyPr/>
-                    <a:lstStyle/>
-                    <a:p>
-                      <a:pPr algn="ctr"/>
-                      <a:r>
-                        <a:rPr lang="en-US" dirty="0" smtClean="0"/>
-                        <a:t>0.85</a:t>
-                      </a:r>
-                      <a:endParaRPr lang="en-US" dirty="0"/>
-                    </a:p>
-                  </a:txBody>
-                  <a:tcPr/>
-                </a:tc>
-                <a:tc>
-                  <a:txBody>
-                    <a:bodyPr/>
-                    <a:lstStyle/>
-                    <a:p>
-                      <a:pPr algn="ctr"/>
-                      <a:r>
-                        <a:rPr lang="en-US" dirty="0" smtClean="0"/>
-                        <a:t>0.99</a:t>
-                      </a:r>
-                      <a:endParaRPr lang="en-US" dirty="0"/>
-                    </a:p>
-                  </a:txBody>
-                  <a:tcPr/>
-                </a:tc>
-                <a:tc>
-                  <a:txBody>
-                    <a:bodyPr/>
-                    <a:lstStyle/>
-                    <a:p>
-                      <a:pPr algn="ctr"/>
-                      <a:r>
-                        <a:rPr lang="en-US" dirty="0" smtClean="0"/>
-                        <a:t>0.91</a:t>
-                      </a:r>
-                      <a:endParaRPr lang="en-US" dirty="0"/>
-                    </a:p>
-                  </a:txBody>
-                  <a:tcPr/>
-                </a:tc>
-              </a:tr>
-              <a:tr h="370840">
-                <a:tc>
-                  <a:txBody>
-                    <a:bodyPr/>
-                    <a:lstStyle/>
-                    <a:p>
-                      <a:r>
-                        <a:rPr lang="en-US" sz="1600" dirty="0" smtClean="0"/>
-                        <a:t>1</a:t>
-                      </a:r>
-                      <a:endParaRPr lang="en-US" sz="1600" dirty="0"/>
-                    </a:p>
-                  </a:txBody>
-                  <a:tcPr/>
-                </a:tc>
-                <a:tc>
-                  <a:txBody>
-                    <a:bodyPr/>
-                    <a:lstStyle/>
-                    <a:p>
-                      <a:pPr algn="ctr"/>
-                      <a:r>
-                        <a:rPr lang="en-US" dirty="0" smtClean="0"/>
-                        <a:t>0.36</a:t>
-                      </a:r>
-                      <a:endParaRPr lang="en-US" dirty="0"/>
-                    </a:p>
-                  </a:txBody>
-                  <a:tcPr/>
-                </a:tc>
-                <a:tc>
-                  <a:txBody>
-                    <a:bodyPr/>
-                    <a:lstStyle/>
-                    <a:p>
-                      <a:pPr algn="ctr"/>
-                      <a:r>
-                        <a:rPr lang="en-US" dirty="0" smtClean="0"/>
-                        <a:t>0.06</a:t>
-                      </a:r>
-                      <a:endParaRPr lang="en-US" dirty="0"/>
-                    </a:p>
-                  </a:txBody>
-                  <a:tcPr/>
-                </a:tc>
-                <a:tc>
-                  <a:txBody>
-                    <a:bodyPr/>
-                    <a:lstStyle/>
-                    <a:p>
-                      <a:pPr algn="ctr"/>
-                      <a:r>
-                        <a:rPr lang="en-US" dirty="0" smtClean="0"/>
-                        <a:t>0.11</a:t>
-                      </a:r>
-                      <a:endParaRPr lang="en-US" dirty="0"/>
-                    </a:p>
-                  </a:txBody>
-                  <a:tcPr/>
-                </a:tc>
-              </a:tr>
-              <a:tr h="370840">
-                <a:tc>
-                  <a:txBody>
-                    <a:bodyPr/>
-                    <a:lstStyle/>
-                    <a:p>
-                      <a:r>
-                        <a:rPr lang="en-US" sz="1600" dirty="0" smtClean="0"/>
-                        <a:t>Accuracy</a:t>
-                      </a:r>
-                      <a:endParaRPr lang="en-US" sz="1600" dirty="0"/>
-                    </a:p>
-                  </a:txBody>
-                  <a:tcPr/>
-                </a:tc>
-                <a:tc>
-                  <a:txBody>
-                    <a:bodyPr/>
-                    <a:lstStyle/>
-                    <a:p>
-                      <a:pPr algn="ctr"/>
-                      <a:endParaRPr lang="en-US" dirty="0"/>
-                    </a:p>
-                  </a:txBody>
-                  <a:tcPr/>
-                </a:tc>
-                <a:tc>
-                  <a:txBody>
-                    <a:bodyPr/>
-                    <a:lstStyle/>
-                    <a:p>
-                      <a:pPr algn="ctr"/>
-                      <a:endParaRPr lang="en-US" dirty="0"/>
-                    </a:p>
-                  </a:txBody>
-                  <a:tcPr/>
-                </a:tc>
-                <a:tc>
-                  <a:txBody>
-                    <a:bodyPr/>
-                    <a:lstStyle/>
-                    <a:p>
-                      <a:pPr algn="ctr"/>
-                      <a:r>
-                        <a:rPr lang="en-US" dirty="0" smtClean="0"/>
-                        <a:t>0.84</a:t>
-                      </a:r>
-                      <a:endParaRPr lang="en-US" dirty="0"/>
-                    </a:p>
-                  </a:txBody>
-                  <a:tcPr/>
-                </a:tc>
-              </a:tr>
-            </a:tbl>
-          </a:graphicData>
-        </a:graphic>
-      </p:graphicFrame>
-      <p:graphicFrame>
-        <p:nvGraphicFramePr>
-          <p:cNvPr id="8" name="Table 7"/>
-          <p:cNvGraphicFramePr>
-            <a:graphicFrameLocks noGrp="1"/>
-          </p:cNvGraphicFramePr>
-          <p:nvPr>
-            <p:extLst>
-              <p:ext uri="{D42A27DB-BD31-4B8C-83A1-F6EECF244321}">
-                <p14:modId xmlns:p14="http://schemas.microsoft.com/office/powerpoint/2010/main" val="2443065806"/>
-              </p:ext>
-            </p:extLst>
-          </p:nvPr>
-        </p:nvGraphicFramePr>
-        <p:xfrm>
-          <a:off x="457200" y="2057400"/>
-          <a:ext cx="2057400" cy="1483360"/>
-        </p:xfrm>
-        <a:graphic>
-          <a:graphicData uri="http://schemas.openxmlformats.org/drawingml/2006/table">
-            <a:tbl>
-              <a:tblPr firstRow="1" bandRow="1">
-                <a:tableStyleId>{5C22544A-7EE6-4342-B048-85BDC9FD1C3A}</a:tableStyleId>
-              </a:tblPr>
-              <a:tblGrid>
-                <a:gridCol w="2057400"/>
-              </a:tblGrid>
-              <a:tr h="370840">
-                <a:tc>
-                  <a:txBody>
-                    <a:bodyPr/>
-                    <a:lstStyle/>
-                    <a:p>
-                      <a:r>
-                        <a:rPr lang="en-US" sz="1600" dirty="0" smtClean="0"/>
-                        <a:t>Label</a:t>
-                      </a:r>
-                      <a:endParaRPr lang="en-US" sz="1600" dirty="0"/>
-                    </a:p>
-                  </a:txBody>
-                  <a:tcPr/>
-                </a:tc>
-              </a:tr>
-              <a:tr h="370840">
-                <a:tc>
-                  <a:txBody>
-                    <a:bodyPr/>
-                    <a:lstStyle/>
-                    <a:p>
-                      <a:r>
-                        <a:rPr lang="en-US" sz="1600" dirty="0" smtClean="0"/>
-                        <a:t>0</a:t>
-                      </a:r>
-                      <a:endParaRPr lang="en-US" sz="1600" dirty="0"/>
-                    </a:p>
-                  </a:txBody>
-                  <a:tcPr/>
-                </a:tc>
-              </a:tr>
-              <a:tr h="370840">
-                <a:tc>
-                  <a:txBody>
-                    <a:bodyPr/>
-                    <a:lstStyle/>
-                    <a:p>
-                      <a:r>
-                        <a:rPr lang="en-US" sz="1600" dirty="0" smtClean="0"/>
-                        <a:t>1</a:t>
-                      </a:r>
-                      <a:endParaRPr lang="en-US" sz="1600" dirty="0"/>
-                    </a:p>
-                  </a:txBody>
-                  <a:tcPr/>
-                </a:tc>
-              </a:tr>
-              <a:tr h="370840">
-                <a:tc>
-                  <a:txBody>
-                    <a:bodyPr/>
-                    <a:lstStyle/>
-                    <a:p>
-                      <a:r>
-                        <a:rPr lang="en-US" sz="1600" dirty="0" smtClean="0"/>
-                        <a:t>Accuracy</a:t>
-                      </a:r>
-                      <a:endParaRPr lang="en-US" sz="1600" dirty="0"/>
-                    </a:p>
-                  </a:txBody>
-                  <a:tcPr/>
-                </a:tc>
-              </a:tr>
-            </a:tbl>
-          </a:graphicData>
-        </a:graphic>
-      </p:graphicFrame>
-      <p:graphicFrame>
-        <p:nvGraphicFramePr>
-          <p:cNvPr id="9" name="Table 8"/>
-          <p:cNvGraphicFramePr>
-            <a:graphicFrameLocks noGrp="1"/>
-          </p:cNvGraphicFramePr>
-          <p:nvPr>
-            <p:extLst>
-              <p:ext uri="{D42A27DB-BD31-4B8C-83A1-F6EECF244321}">
-                <p14:modId xmlns:p14="http://schemas.microsoft.com/office/powerpoint/2010/main" val="124945657"/>
-              </p:ext>
-            </p:extLst>
-          </p:nvPr>
-        </p:nvGraphicFramePr>
-        <p:xfrm>
-          <a:off x="457200" y="4343400"/>
-          <a:ext cx="8229600" cy="1483360"/>
-        </p:xfrm>
-        <a:graphic>
-          <a:graphicData uri="http://schemas.openxmlformats.org/drawingml/2006/table">
-            <a:tbl>
-              <a:tblPr firstRow="1" bandRow="1">
-                <a:tableStyleId>{5C22544A-7EE6-4342-B048-85BDC9FD1C3A}</a:tableStyleId>
-              </a:tblPr>
-              <a:tblGrid>
-                <a:gridCol w="2057400"/>
-                <a:gridCol w="2057400"/>
-                <a:gridCol w="2057400"/>
-                <a:gridCol w="2057400"/>
-              </a:tblGrid>
-              <a:tr h="370840">
-                <a:tc>
-                  <a:txBody>
-                    <a:bodyPr/>
-                    <a:lstStyle/>
-                    <a:p>
-                      <a:r>
-                        <a:rPr lang="en-US" sz="1600" dirty="0" smtClean="0"/>
-                        <a:t>Label</a:t>
-                      </a:r>
-                      <a:endParaRPr lang="en-US" sz="1600" dirty="0"/>
-                    </a:p>
-                  </a:txBody>
-                  <a:tcPr/>
-                </a:tc>
-                <a:tc>
-                  <a:txBody>
-                    <a:bodyPr/>
-                    <a:lstStyle/>
-                    <a:p>
-                      <a:pPr algn="ctr"/>
-                      <a:r>
-                        <a:rPr lang="en-US" sz="1600" dirty="0" smtClean="0"/>
-                        <a:t>Precision</a:t>
-                      </a:r>
-                      <a:endParaRPr lang="en-US" sz="1600" dirty="0"/>
-                    </a:p>
-                  </a:txBody>
-                  <a:tcPr/>
-                </a:tc>
-                <a:tc>
-                  <a:txBody>
-                    <a:bodyPr/>
-                    <a:lstStyle/>
-                    <a:p>
-                      <a:pPr algn="ctr"/>
-                      <a:r>
-                        <a:rPr lang="en-US" sz="1600" dirty="0" smtClean="0"/>
-                        <a:t>Recall</a:t>
-                      </a:r>
-                      <a:endParaRPr lang="en-US" sz="1600" dirty="0"/>
-                    </a:p>
-                  </a:txBody>
-                  <a:tcPr/>
-                </a:tc>
-                <a:tc>
-                  <a:txBody>
-                    <a:bodyPr/>
-                    <a:lstStyle/>
-                    <a:p>
-                      <a:pPr algn="ctr"/>
-                      <a:r>
-                        <a:rPr lang="en-US" sz="1600" dirty="0" smtClean="0"/>
-                        <a:t>F1</a:t>
-                      </a:r>
-                      <a:endParaRPr lang="en-US" sz="1600" dirty="0"/>
-                    </a:p>
-                  </a:txBody>
-                  <a:tcPr/>
-                </a:tc>
-              </a:tr>
-              <a:tr h="370840">
-                <a:tc>
-                  <a:txBody>
-                    <a:bodyPr/>
-                    <a:lstStyle/>
-                    <a:p>
-                      <a:r>
-                        <a:rPr lang="en-US" sz="1600" dirty="0" smtClean="0"/>
-                        <a:t>0</a:t>
-                      </a:r>
-                      <a:endParaRPr lang="en-US" sz="1600" dirty="0"/>
-                    </a:p>
-                  </a:txBody>
-                  <a:tcPr/>
-                </a:tc>
-                <a:tc>
-                  <a:txBody>
-                    <a:bodyPr/>
-                    <a:lstStyle/>
-                    <a:p>
-                      <a:pPr algn="ctr"/>
-                      <a:r>
-                        <a:rPr lang="en-US" dirty="0" smtClean="0"/>
-                        <a:t>0.88</a:t>
-                      </a:r>
-                      <a:endParaRPr lang="en-US" dirty="0"/>
-                    </a:p>
-                  </a:txBody>
-                  <a:tcPr/>
-                </a:tc>
-                <a:tc>
-                  <a:txBody>
-                    <a:bodyPr/>
-                    <a:lstStyle/>
-                    <a:p>
-                      <a:pPr algn="ctr"/>
-                      <a:r>
-                        <a:rPr lang="en-US" dirty="0" smtClean="0"/>
-                        <a:t>0.59</a:t>
-                      </a:r>
-                      <a:endParaRPr lang="en-US" dirty="0"/>
-                    </a:p>
-                  </a:txBody>
-                  <a:tcPr/>
-                </a:tc>
-                <a:tc>
-                  <a:txBody>
-                    <a:bodyPr/>
-                    <a:lstStyle/>
-                    <a:p>
-                      <a:pPr algn="ctr"/>
-                      <a:r>
-                        <a:rPr lang="en-US" dirty="0" smtClean="0"/>
-                        <a:t>0.71</a:t>
-                      </a:r>
-                      <a:endParaRPr lang="en-US" dirty="0"/>
-                    </a:p>
-                  </a:txBody>
-                  <a:tcPr/>
-                </a:tc>
-              </a:tr>
-              <a:tr h="370840">
-                <a:tc>
-                  <a:txBody>
-                    <a:bodyPr/>
-                    <a:lstStyle/>
-                    <a:p>
-                      <a:r>
-                        <a:rPr lang="en-US" sz="1600" dirty="0" smtClean="0"/>
-                        <a:t>1</a:t>
-                      </a:r>
-                      <a:endParaRPr lang="en-US" sz="1600" dirty="0"/>
-                    </a:p>
-                  </a:txBody>
-                  <a:tcPr/>
-                </a:tc>
-                <a:tc>
-                  <a:txBody>
-                    <a:bodyPr/>
-                    <a:lstStyle/>
-                    <a:p>
-                      <a:pPr algn="ctr"/>
-                      <a:r>
-                        <a:rPr lang="en-US" dirty="0" smtClean="0"/>
-                        <a:t>0.22</a:t>
-                      </a:r>
-                      <a:endParaRPr lang="en-US" dirty="0"/>
-                    </a:p>
-                  </a:txBody>
-                  <a:tcPr/>
-                </a:tc>
-                <a:tc>
-                  <a:txBody>
-                    <a:bodyPr/>
-                    <a:lstStyle/>
-                    <a:p>
-                      <a:pPr algn="ctr"/>
-                      <a:r>
-                        <a:rPr lang="en-US" dirty="0" smtClean="0"/>
-                        <a:t>0.60</a:t>
-                      </a:r>
-                      <a:endParaRPr lang="en-US" dirty="0"/>
-                    </a:p>
-                  </a:txBody>
-                  <a:tcPr/>
-                </a:tc>
-                <a:tc>
-                  <a:txBody>
-                    <a:bodyPr/>
-                    <a:lstStyle/>
-                    <a:p>
-                      <a:pPr algn="ctr"/>
-                      <a:r>
-                        <a:rPr lang="en-US" dirty="0" smtClean="0"/>
-                        <a:t>0.32</a:t>
-                      </a:r>
-                      <a:endParaRPr lang="en-US" dirty="0"/>
-                    </a:p>
-                  </a:txBody>
-                  <a:tcPr/>
-                </a:tc>
-              </a:tr>
-              <a:tr h="370840">
-                <a:tc>
-                  <a:txBody>
-                    <a:bodyPr/>
-                    <a:lstStyle/>
-                    <a:p>
-                      <a:r>
-                        <a:rPr lang="en-US" sz="1600" dirty="0" smtClean="0"/>
-                        <a:t>Accuracy</a:t>
-                      </a:r>
-                      <a:endParaRPr lang="en-US" sz="1600" dirty="0"/>
-                    </a:p>
-                  </a:txBody>
-                  <a:tcPr/>
-                </a:tc>
-                <a:tc>
-                  <a:txBody>
-                    <a:bodyPr/>
-                    <a:lstStyle/>
-                    <a:p>
-                      <a:pPr algn="ctr"/>
-                      <a:endParaRPr lang="en-US" dirty="0"/>
-                    </a:p>
-                  </a:txBody>
-                  <a:tcPr/>
-                </a:tc>
-                <a:tc>
-                  <a:txBody>
-                    <a:bodyPr/>
-                    <a:lstStyle/>
-                    <a:p>
-                      <a:pPr algn="ctr"/>
-                      <a:endParaRPr lang="en-US" dirty="0"/>
-                    </a:p>
-                  </a:txBody>
-                  <a:tcPr/>
-                </a:tc>
-                <a:tc>
-                  <a:txBody>
-                    <a:bodyPr/>
-                    <a:lstStyle/>
-                    <a:p>
-                      <a:pPr algn="ctr"/>
-                      <a:r>
-                        <a:rPr lang="en-US" dirty="0" smtClean="0"/>
-                        <a:t>0.59</a:t>
-                      </a:r>
-                      <a:endParaRPr lang="en-US" dirty="0"/>
-                    </a:p>
-                  </a:txBody>
-                  <a:tcPr/>
-                </a:tc>
-              </a:tr>
-            </a:tbl>
-          </a:graphicData>
-        </a:graphic>
-      </p:graphicFrame>
-      <p:graphicFrame>
-        <p:nvGraphicFramePr>
-          <p:cNvPr id="10" name="Table 9"/>
-          <p:cNvGraphicFramePr>
-            <a:graphicFrameLocks noGrp="1"/>
-          </p:cNvGraphicFramePr>
-          <p:nvPr>
-            <p:extLst>
-              <p:ext uri="{D42A27DB-BD31-4B8C-83A1-F6EECF244321}">
-                <p14:modId xmlns:p14="http://schemas.microsoft.com/office/powerpoint/2010/main" val="974869510"/>
-              </p:ext>
-            </p:extLst>
-          </p:nvPr>
-        </p:nvGraphicFramePr>
-        <p:xfrm>
-          <a:off x="457200" y="4343400"/>
-          <a:ext cx="2057400" cy="1483360"/>
-        </p:xfrm>
-        <a:graphic>
-          <a:graphicData uri="http://schemas.openxmlformats.org/drawingml/2006/table">
-            <a:tbl>
-              <a:tblPr firstRow="1" bandRow="1">
-                <a:tableStyleId>{5C22544A-7EE6-4342-B048-85BDC9FD1C3A}</a:tableStyleId>
-              </a:tblPr>
-              <a:tblGrid>
-                <a:gridCol w="2057400"/>
-              </a:tblGrid>
-              <a:tr h="370840">
-                <a:tc>
-                  <a:txBody>
-                    <a:bodyPr/>
-                    <a:lstStyle/>
-                    <a:p>
-                      <a:r>
-                        <a:rPr lang="en-US" sz="1600" dirty="0" smtClean="0"/>
-                        <a:t>Label</a:t>
-                      </a:r>
-                      <a:endParaRPr lang="en-US" sz="1600" dirty="0"/>
-                    </a:p>
-                  </a:txBody>
-                  <a:tcPr/>
-                </a:tc>
-              </a:tr>
-              <a:tr h="370840">
-                <a:tc>
-                  <a:txBody>
-                    <a:bodyPr/>
-                    <a:lstStyle/>
-                    <a:p>
-                      <a:r>
-                        <a:rPr lang="en-US" sz="1600" dirty="0" smtClean="0"/>
-                        <a:t>0</a:t>
-                      </a:r>
-                      <a:endParaRPr lang="en-US" sz="1600" dirty="0"/>
-                    </a:p>
-                  </a:txBody>
-                  <a:tcPr/>
-                </a:tc>
-              </a:tr>
-              <a:tr h="370840">
-                <a:tc>
-                  <a:txBody>
-                    <a:bodyPr/>
-                    <a:lstStyle/>
-                    <a:p>
-                      <a:r>
-                        <a:rPr lang="en-US" sz="1600" dirty="0" smtClean="0"/>
-                        <a:t>1</a:t>
-                      </a:r>
-                      <a:endParaRPr lang="en-US" sz="1600" dirty="0"/>
-                    </a:p>
-                  </a:txBody>
-                  <a:tcPr/>
-                </a:tc>
-              </a:tr>
-              <a:tr h="370840">
-                <a:tc>
-                  <a:txBody>
-                    <a:bodyPr/>
-                    <a:lstStyle/>
-                    <a:p>
-                      <a:r>
-                        <a:rPr lang="en-US" sz="1600" dirty="0" smtClean="0"/>
-                        <a:t>Accuracy</a:t>
-                      </a:r>
-                      <a:endParaRPr lang="en-US" sz="1600" dirty="0"/>
-                    </a:p>
-                  </a:txBody>
-                  <a:tcPr/>
-                </a:tc>
-              </a:tr>
-            </a:tbl>
-          </a:graphicData>
-        </a:graphic>
-      </p:graphicFrame>
-      <p:sp>
-        <p:nvSpPr>
-          <p:cNvPr id="11" name="TextBox 10"/>
-          <p:cNvSpPr txBox="1"/>
-          <p:nvPr/>
-        </p:nvSpPr>
-        <p:spPr>
-          <a:xfrm>
-            <a:off x="457200" y="1600200"/>
-            <a:ext cx="4648200" cy="381000"/>
-          </a:xfrm>
-          <a:prstGeom prst="rect">
-            <a:avLst/>
-          </a:prstGeom>
-          <a:noFill/>
-        </p:spPr>
-        <p:txBody>
-          <a:bodyPr wrap="square" rtlCol="0">
-            <a:spAutoFit/>
-          </a:bodyPr>
+      <p:sp>
+        <p:nvSpPr>
+          <p:cNvPr id="5" name="Content Placeholder 4"/>
+          <p:cNvSpPr>
+            <a:spLocks noGrp="1"/>
+          </p:cNvSpPr>
+          <p:nvPr>
+            <p:ph idx="1"/>
+          </p:nvPr>
+        </p:nvSpPr>
+        <p:spPr/>
+        <p:txBody>
+          <a:bodyPr/>
           <a:lstStyle/>
           <a:p>
             <a:r>
               <a:rPr lang="en-US" dirty="0" smtClean="0"/>
-              <a:t>Binary Classification, full tree</a:t>
-            </a:r>
-            <a:endParaRPr lang="en-US" dirty="0"/>
-          </a:p>
-        </p:txBody>
-      </p:sp>
-      <p:sp>
-        <p:nvSpPr>
-          <p:cNvPr id="12" name="TextBox 11"/>
-          <p:cNvSpPr txBox="1"/>
-          <p:nvPr/>
-        </p:nvSpPr>
-        <p:spPr>
-          <a:xfrm>
-            <a:off x="457200" y="3886200"/>
-            <a:ext cx="8229600" cy="369332"/>
-          </a:xfrm>
-          <a:prstGeom prst="rect">
-            <a:avLst/>
-          </a:prstGeom>
-          <a:noFill/>
-        </p:spPr>
-        <p:txBody>
-          <a:bodyPr wrap="square" rtlCol="0">
-            <a:spAutoFit/>
-          </a:bodyPr>
-          <a:lstStyle/>
-          <a:p>
-            <a:r>
-              <a:rPr lang="en-US" dirty="0" smtClean="0"/>
-              <a:t>Binary Classification, </a:t>
-            </a:r>
-            <a:r>
-              <a:rPr lang="en-US" dirty="0" err="1" smtClean="0"/>
-              <a:t>hyperparameters</a:t>
-            </a:r>
-            <a:r>
-              <a:rPr lang="en-US" dirty="0" smtClean="0"/>
-              <a:t> determined by </a:t>
-            </a:r>
-            <a:r>
-              <a:rPr lang="en-US" dirty="0" err="1" smtClean="0"/>
-              <a:t>RandomSearchCV</a:t>
+              <a:t>Top features</a:t>
             </a:r>
             <a:endParaRPr lang="en-US" dirty="0"/>
           </a:p>
@@ -7112,7 +6735,7 @@
     </p:spTree>
     <p:extLst>
       <p:ext uri="{BB962C8B-B14F-4D97-AF65-F5344CB8AC3E}">
-        <p14:creationId xmlns:p14="http://schemas.microsoft.com/office/powerpoint/2010/main" val="2878103684"/>
+        <p14:creationId xmlns:p14="http://schemas.microsoft.com/office/powerpoint/2010/main" val="3481656480"/>
       </p:ext>
     </p:extLst>
   </p:cSld>
@@ -7166,7 +6789,7 @@
               <a:rPr lang="en-US" cap="small" dirty="0" smtClean="0">
                 <a:latin typeface="Impact" panose="020B0806030902050204" pitchFamily="34" charset="0"/>
               </a:rPr>
-              <a:t>Random Forest</a:t>
+              <a:t>Support Vector Classification</a:t>
             </a:r>
             <a:endParaRPr lang="en-US" cap="small" dirty="0">
               <a:latin typeface="Impact" panose="020B0806030902050204" pitchFamily="34" charset="0"/>
@@ -7176,7 +6799,7 @@
       </p:sp>
       <p:sp>
         <p:nvSpPr>
-          <p:cNvPr id="5" name="Content Placeholder 4"/>
+          <p:cNvPr id="3" name="Content Placeholder 2"/>
           <p:cNvSpPr>
             <a:spLocks noGrp="1"/>
           </p:cNvSpPr>
@@ -7186,21 +6809,70 @@
         </p:nvSpPr>
         <p:spPr/>
         <p:txBody>
-          <a:bodyPr/>
+          <a:bodyPr>
+            <a:normAutofit/>
+          </a:bodyPr>
           <a:lstStyle/>
           <a:p>
             <a:r>
               <a:rPr lang="en-US" dirty="0" smtClean="0"/>
-              <a:t>Top features</a:t>
+              <a:t>Model did not complete </a:t>
+            </a:r>
+          </a:p>
+          <a:p>
+            <a:r>
+              <a:rPr lang="en-US" dirty="0" smtClean="0"/>
+              <a:t>Run time over 20 hours</a:t>
             </a:r>
             <a:endParaRPr lang="en-US" dirty="0"/>
           </a:p>
         </p:txBody>
       </p:sp>
+      <p:pic>
+        <p:nvPicPr>
+          <p:cNvPr id="5123" name="Picture 3" descr="D:\Documents\School\UCI Data Analytics Boot Camp\Projects Research\Project 4 Research\Stock Images\[Custom - 463x309] pexels-bentonphotocinema-1095601.jpg"/>
+          <p:cNvPicPr>
+            <a:picLocks noChangeAspect="1" noChangeArrowheads="1"/>
+          </p:cNvPicPr>
+          <p:nvPr/>
+        </p:nvPicPr>
+        <p:blipFill>
+          <a:blip r:embed="rId2">
+            <a:extLst>
+              <a:ext uri="{28A0092B-C50C-407E-A947-70E740481C1C}">
+                <a14:useLocalDpi xmlns:a14="http://schemas.microsoft.com/office/drawing/2010/main" val="0"/>
+              </a:ext>
+            </a:extLst>
+          </a:blip>
+          <a:srcRect/>
+          <a:stretch>
+            <a:fillRect/>
+          </a:stretch>
+        </p:blipFill>
+        <p:spPr bwMode="auto">
+          <a:xfrm>
+            <a:off x="1845818" y="2743200"/>
+            <a:ext cx="5880100" cy="3924300"/>
+          </a:xfrm>
+          <a:prstGeom prst="rect">
+            <a:avLst/>
+          </a:prstGeom>
+          <a:noFill/>
+          <a:extLst>
+            <a:ext uri="{909E8E84-426E-40DD-AFC4-6F175D3DCCD1}">
+              <a14:hiddenFill xmlns:a14="http://schemas.microsoft.com/office/drawing/2010/main">
+                <a:solidFill>
+                  <a:srgbClr val="FFFFFF"/>
+                </a:solidFill>
+              </a14:hiddenFill>
+            </a:ext>
+          </a:extLst>
+        </p:spPr>
+      </p:pic>
     </p:spTree>
     <p:extLst>
       <p:ext uri="{BB962C8B-B14F-4D97-AF65-F5344CB8AC3E}">
-        <p14:creationId xmlns:p14="http://schemas.microsoft.com/office/powerpoint/2010/main" val="3481656480"/>
+        <p14:creationId xmlns:p14="http://schemas.microsoft.com/office/powerpoint/2010/main" val="3736660283"/>
       </p:ext>
     </p:extLst>
   </p:cSld>

</xml_diff>